<commit_message>
not more workspace switch
</commit_message>
<xml_diff>
--- a/keyb.pptx
+++ b/keyb.pptx
@@ -7150,8 +7150,8 @@
         </p:nvSpPr>
         <p:spPr bwMode="auto">
           <a:xfrm flipH="0" flipV="0">
-            <a:off x="8426740" y="2827301"/>
-            <a:ext cx="704453" cy="244199"/>
+            <a:off x="8426739" y="2827300"/>
+            <a:ext cx="710572" cy="244199"/>
           </a:xfrm>
           <a:prstGeom prst="rect">
             <a:avLst/>
@@ -7172,7 +7172,7 @@
                   <a:srgbClr val="00FF00"/>
                 </a:highlight>
               </a:rPr>
-              <a:t>WorkSp</a:t>
+              <a:t>pgDown</a:t>
             </a:r>
             <a:endParaRPr sz="1000">
               <a:highlight>
@@ -7942,8 +7942,8 @@
         </p:nvSpPr>
         <p:spPr bwMode="auto">
           <a:xfrm flipH="0" flipV="0">
-            <a:off x="7543831" y="2811953"/>
-            <a:ext cx="704813" cy="244199"/>
+            <a:off x="7543830" y="2811952"/>
+            <a:ext cx="708412" cy="244199"/>
           </a:xfrm>
           <a:prstGeom prst="rect">
             <a:avLst/>
@@ -7964,7 +7964,7 @@
                   <a:srgbClr val="00FF00"/>
                 </a:highlight>
               </a:rPr>
-              <a:t>WorkSp</a:t>
+              <a:t>pgUp</a:t>
             </a:r>
             <a:endParaRPr sz="1000">
               <a:highlight>

</xml_diff>

<commit_message>
alt is ctrl and tab *
</commit_message>
<xml_diff>
--- a/keyb.pptx
+++ b/keyb.pptx
@@ -6346,7 +6346,7 @@
         </p:nvSpPr>
         <p:spPr bwMode="auto">
           <a:xfrm flipH="0" flipV="0">
-            <a:off x="9533514" y="2803522"/>
+            <a:off x="9489163" y="1831972"/>
             <a:ext cx="350257" cy="457560"/>
           </a:xfrm>
           <a:prstGeom prst="rect">
@@ -7981,8 +7981,8 @@
         </p:nvSpPr>
         <p:spPr bwMode="auto">
           <a:xfrm flipH="0" flipV="0">
-            <a:off x="9682803" y="2934051"/>
-            <a:ext cx="713091" cy="244199"/>
+            <a:off x="9681363" y="2946539"/>
+            <a:ext cx="715970" cy="213719"/>
           </a:xfrm>
           <a:prstGeom prst="rect">
             <a:avLst/>
@@ -7998,14 +7998,22 @@
               <a:defRPr/>
             </a:pPr>
             <a:r>
-              <a:rPr sz="1000">
+              <a:rPr sz="800">
+                <a:highlight>
+                  <a:srgbClr val="FFFF00"/>
+                </a:highlight>
+              </a:rPr>
+              <a:t>hold:</a:t>
+            </a:r>
+            <a:r>
+              <a:rPr sz="800">
                 <a:highlight>
                   <a:srgbClr val="FFFF00"/>
                 </a:highlight>
               </a:rPr>
               <a:t>shift</a:t>
             </a:r>
-            <a:endParaRPr sz="1000">
+            <a:endParaRPr sz="800">
               <a:highlight>
                 <a:srgbClr val="00FF00"/>
               </a:highlight>
@@ -8100,6 +8108,90 @@
               <a:t>gpt_click</a:t>
             </a:r>
             <a:endParaRPr sz="900"/>
+          </a:p>
+        </p:txBody>
+      </p:sp>
+      <p:sp>
+        <p:nvSpPr>
+          <p:cNvPr id="1030023750" name=""/>
+          <p:cNvSpPr txBox="1"/>
+          <p:nvPr/>
+        </p:nvSpPr>
+        <p:spPr bwMode="auto">
+          <a:xfrm flipH="0" flipV="0">
+            <a:off x="2476497" y="3714022"/>
+            <a:ext cx="973726" cy="305159"/>
+          </a:xfrm>
+          <a:prstGeom prst="rect">
+            <a:avLst/>
+          </a:prstGeom>
+          <a:noFill/>
+        </p:spPr>
+        <p:txBody>
+          <a:bodyPr vertOverflow="overflow" horzOverflow="overflow" vert="horz" wrap="square" lIns="91440" tIns="45720" rIns="91440" bIns="45720" numCol="1" spcCol="0" rtlCol="0" fromWordArt="0" anchor="t" anchorCtr="0" forceAA="0" upright="0" compatLnSpc="0">
+            <a:spAutoFit/>
+          </a:bodyPr>
+          <a:p>
+            <a:pPr>
+              <a:defRPr/>
+            </a:pPr>
+            <a:r>
+              <a:rPr lang="en-US" sz="1400" b="0" i="0" u="none" strike="noStrike" cap="none" spc="0">
+                <a:solidFill>
+                  <a:schemeClr val="tx1"/>
+                </a:solidFill>
+                <a:highlight>
+                  <a:srgbClr val="00FFFF"/>
+                </a:highlight>
+                <a:latin typeface="Arial"/>
+                <a:ea typeface="Arial"/>
+                <a:cs typeface="Arial"/>
+              </a:rPr>
+              <a:t>ctrl</a:t>
+            </a:r>
+            <a:endParaRPr/>
+          </a:p>
+        </p:txBody>
+      </p:sp>
+      <p:sp>
+        <p:nvSpPr>
+          <p:cNvPr id="1852436078" name=""/>
+          <p:cNvSpPr txBox="1"/>
+          <p:nvPr/>
+        </p:nvSpPr>
+        <p:spPr bwMode="auto">
+          <a:xfrm flipH="0" flipV="0">
+            <a:off x="9681363" y="2689959"/>
+            <a:ext cx="308484" cy="259439"/>
+          </a:xfrm>
+          <a:prstGeom prst="rect">
+            <a:avLst/>
+          </a:prstGeom>
+          <a:noFill/>
+        </p:spPr>
+        <p:txBody>
+          <a:bodyPr vertOverflow="overflow" horzOverflow="overflow" vert="horz" wrap="square" lIns="91440" tIns="45720" rIns="91440" bIns="45720" numCol="1" spcCol="0" rtlCol="0" fromWordArt="0" anchor="t" anchorCtr="0" forceAA="0" upright="0" compatLnSpc="0">
+            <a:spAutoFit/>
+          </a:bodyPr>
+          <a:p>
+            <a:pPr>
+              <a:defRPr/>
+            </a:pPr>
+            <a:r>
+              <a:rPr lang="en-US" sz="1100" b="0" i="0" u="none" strike="noStrike" cap="none" spc="0">
+                <a:solidFill>
+                  <a:schemeClr val="tx1"/>
+                </a:solidFill>
+                <a:highlight>
+                  <a:srgbClr val="FF0000"/>
+                </a:highlight>
+                <a:latin typeface="Arial"/>
+                <a:ea typeface="Arial"/>
+                <a:cs typeface="Arial"/>
+              </a:rPr>
+              <a:t>*</a:t>
+            </a:r>
+            <a:endParaRPr sz="1100"/>
           </a:p>
         </p:txBody>
       </p:sp>

</xml_diff>